<commit_message>
add netdiffusion slides specifically
</commit_message>
<xml_diff>
--- a/docs/slides/10-LinearRegression.pptx
+++ b/docs/slides/10-LinearRegression.pptx
@@ -5323,7 +5323,7 @@
           <a:p>
             <a:fld id="{E50CF968-FEF3-EB46-B83A-6265E01A661D}" type="datetimeFigureOut">
               <a:rPr lang="en-US" smtClean="0"/>
-              <a:t>10/25/22</a:t>
+              <a:t>11/3/25</a:t>
             </a:fld>
             <a:endParaRPr lang="en-US"/>
           </a:p>
@@ -7541,7 +7541,7 @@
           <a:p>
             <a:fld id="{8185FBBC-6FD9-0C44-8F9C-D1B26DF66FB3}" type="datetimeFigureOut">
               <a:rPr lang="en-US" smtClean="0"/>
-              <a:t>10/25/22</a:t>
+              <a:t>11/3/25</a:t>
             </a:fld>
             <a:endParaRPr lang="en-US"/>
           </a:p>
@@ -7739,7 +7739,7 @@
           <a:p>
             <a:fld id="{8185FBBC-6FD9-0C44-8F9C-D1B26DF66FB3}" type="datetimeFigureOut">
               <a:rPr lang="en-US" smtClean="0"/>
-              <a:t>10/25/22</a:t>
+              <a:t>11/3/25</a:t>
             </a:fld>
             <a:endParaRPr lang="en-US"/>
           </a:p>
@@ -7947,7 +7947,7 @@
           <a:p>
             <a:fld id="{8185FBBC-6FD9-0C44-8F9C-D1B26DF66FB3}" type="datetimeFigureOut">
               <a:rPr lang="en-US" smtClean="0"/>
-              <a:t>10/25/22</a:t>
+              <a:t>11/3/25</a:t>
             </a:fld>
             <a:endParaRPr lang="en-US"/>
           </a:p>
@@ -8145,7 +8145,7 @@
           <a:p>
             <a:fld id="{8185FBBC-6FD9-0C44-8F9C-D1B26DF66FB3}" type="datetimeFigureOut">
               <a:rPr lang="en-US" smtClean="0"/>
-              <a:t>10/25/22</a:t>
+              <a:t>11/3/25</a:t>
             </a:fld>
             <a:endParaRPr lang="en-US"/>
           </a:p>
@@ -8420,7 +8420,7 @@
           <a:p>
             <a:fld id="{8185FBBC-6FD9-0C44-8F9C-D1B26DF66FB3}" type="datetimeFigureOut">
               <a:rPr lang="en-US" smtClean="0"/>
-              <a:t>10/25/22</a:t>
+              <a:t>11/3/25</a:t>
             </a:fld>
             <a:endParaRPr lang="en-US"/>
           </a:p>
@@ -8685,7 +8685,7 @@
           <a:p>
             <a:fld id="{8185FBBC-6FD9-0C44-8F9C-D1B26DF66FB3}" type="datetimeFigureOut">
               <a:rPr lang="en-US" smtClean="0"/>
-              <a:t>10/25/22</a:t>
+              <a:t>11/3/25</a:t>
             </a:fld>
             <a:endParaRPr lang="en-US"/>
           </a:p>
@@ -9097,7 +9097,7 @@
           <a:p>
             <a:fld id="{8185FBBC-6FD9-0C44-8F9C-D1B26DF66FB3}" type="datetimeFigureOut">
               <a:rPr lang="en-US" smtClean="0"/>
-              <a:t>10/25/22</a:t>
+              <a:t>11/3/25</a:t>
             </a:fld>
             <a:endParaRPr lang="en-US"/>
           </a:p>
@@ -9238,7 +9238,7 @@
           <a:p>
             <a:fld id="{8185FBBC-6FD9-0C44-8F9C-D1B26DF66FB3}" type="datetimeFigureOut">
               <a:rPr lang="en-US" smtClean="0"/>
-              <a:t>10/25/22</a:t>
+              <a:t>11/3/25</a:t>
             </a:fld>
             <a:endParaRPr lang="en-US"/>
           </a:p>
@@ -9351,7 +9351,7 @@
           <a:p>
             <a:fld id="{8185FBBC-6FD9-0C44-8F9C-D1B26DF66FB3}" type="datetimeFigureOut">
               <a:rPr lang="en-US" smtClean="0"/>
-              <a:t>10/25/22</a:t>
+              <a:t>11/3/25</a:t>
             </a:fld>
             <a:endParaRPr lang="en-US"/>
           </a:p>
@@ -9662,7 +9662,7 @@
           <a:p>
             <a:fld id="{8185FBBC-6FD9-0C44-8F9C-D1B26DF66FB3}" type="datetimeFigureOut">
               <a:rPr lang="en-US" smtClean="0"/>
-              <a:t>10/25/22</a:t>
+              <a:t>11/3/25</a:t>
             </a:fld>
             <a:endParaRPr lang="en-US"/>
           </a:p>
@@ -9950,7 +9950,7 @@
           <a:p>
             <a:fld id="{8185FBBC-6FD9-0C44-8F9C-D1B26DF66FB3}" type="datetimeFigureOut">
               <a:rPr lang="en-US" smtClean="0"/>
-              <a:t>10/25/22</a:t>
+              <a:t>11/3/25</a:t>
             </a:fld>
             <a:endParaRPr lang="en-US"/>
           </a:p>
@@ -10191,7 +10191,7 @@
           <a:p>
             <a:fld id="{8185FBBC-6FD9-0C44-8F9C-D1B26DF66FB3}" type="datetimeFigureOut">
               <a:rPr lang="en-US" smtClean="0"/>
-              <a:t>10/25/22</a:t>
+              <a:t>11/3/25</a:t>
             </a:fld>
             <a:endParaRPr lang="en-US"/>
           </a:p>

</xml_diff>